<commit_message>
Created NavigationBarView, moved static JSON data to ThatConf.js
</commit_message>
<xml_diff>
--- a/speakerSlides.pptx
+++ b/speakerSlides.pptx
@@ -1303,7 +1303,7 @@
           </a:ln>
           <a:extLst>
             <a:ext uri="{C572A759-6A51-4108-AA02-DFA0A04FC94B}">
-              <ma14:wrappingTextBoxFlag xmlns:ma14="http://schemas.microsoft.com/office/mac/drawingml/2011/main" xmlns="" val="1"/>
+              <ma14:wrappingTextBoxFlag xmlns="" xmlns:ma14="http://schemas.microsoft.com/office/mac/drawingml/2011/main" val="1"/>
             </a:ext>
           </a:extLst>
         </p:spPr>
@@ -1346,7 +1346,7 @@
           </a:ln>
           <a:extLst>
             <a:ext uri="{C572A759-6A51-4108-AA02-DFA0A04FC94B}">
-              <ma14:wrappingTextBoxFlag xmlns:ma14="http://schemas.microsoft.com/office/mac/drawingml/2011/main" xmlns="" val="1"/>
+              <ma14:wrappingTextBoxFlag xmlns="" xmlns:ma14="http://schemas.microsoft.com/office/mac/drawingml/2011/main" val="1"/>
             </a:ext>
           </a:extLst>
         </p:spPr>
@@ -2547,8 +2547,19 @@
           <a:p>
             <a:r>
               <a:rPr lang="en-US" sz="7200" dirty="0" smtClean="0"/>
-              <a:t>Generous training allowance</a:t>
-            </a:r>
+              <a:t>Generous training </a:t>
+            </a:r>
+            <a:r>
+              <a:rPr lang="en-US" sz="7200" dirty="0" smtClean="0"/>
+              <a:t>allowance</a:t>
+            </a:r>
+          </a:p>
+          <a:p>
+            <a:r>
+              <a:rPr lang="en-US" sz="7200" dirty="0" smtClean="0"/>
+              <a:t>Talk to me if interested</a:t>
+            </a:r>
+            <a:endParaRPr lang="en-US" sz="7200" dirty="0" smtClean="0"/>
           </a:p>
           <a:p>
             <a:endParaRPr lang="en-US" sz="7200" dirty="0"/>

</xml_diff>